<commit_message>
Updated the course to actually be legal
</commit_message>
<xml_diff>
--- a/21-25 rounds/I Have Standards - 24 Rounds - Virginia Count/I Have Standards.pptx
+++ b/21-25 rounds/I Have Standards - 24 Rounds - Virginia Count/I Have Standards.pptx
@@ -8,7 +8,7 @@
     <p:notesMasterId r:id="rId3"/>
   </p:notesMasterIdLst>
   <p:sldIdLst>
-    <p:sldId id="274" r:id="rId2"/>
+    <p:sldId id="275" r:id="rId2"/>
   </p:sldIdLst>
   <p:sldSz cx="7315200" cy="9601200"/>
   <p:notesSz cx="6858000" cy="9144000"/>
@@ -258,7 +258,7 @@
               <a:pPr>
                 <a:defRPr/>
               </a:pPr>
-              <a:t>6/17/2019</a:t>
+              <a:t>6/19/2019</a:t>
             </a:fld>
             <a:endParaRPr lang="en-US"/>
           </a:p>
@@ -598,6 +598,10 @@
           </p:nvPr>
         </p:nvSpPr>
         <p:spPr bwMode="auto">
+          <a:xfrm>
+            <a:off x="2122488" y="685800"/>
+            <a:ext cx="2613025" cy="3429000"/>
+          </a:xfrm>
           <a:noFill/>
           <a:ln>
             <a:solidFill>
@@ -4128,14 +4132,6 @@
 <file path=ppt/slides/slide1.xml><?xml version="1.0" encoding="utf-8"?>
 <p:sld xmlns:a="http://schemas.openxmlformats.org/drawingml/2006/main" xmlns:r="http://schemas.openxmlformats.org/officeDocument/2006/relationships" xmlns:p="http://schemas.openxmlformats.org/presentationml/2006/main">
   <p:cSld>
-    <p:bg>
-      <p:bgPr>
-        <a:solidFill>
-          <a:schemeClr val="bg1"/>
-        </a:solidFill>
-        <a:effectLst/>
-      </p:bgPr>
-    </p:bg>
     <p:spTree>
       <p:nvGrpSpPr>
         <p:cNvPr id="1" name=""/>
@@ -4157,16 +4153,12 @@
             <a:graphicFrameLocks noGrp="1"/>
           </p:cNvGraphicFramePr>
           <p:nvPr>
-            <p:extLst>
-              <p:ext uri="{D42A27DB-BD31-4B8C-83A1-F6EECF244321}">
-                <p14:modId xmlns:p14="http://schemas.microsoft.com/office/powerpoint/2010/main" val="2285980551"/>
-              </p:ext>
-            </p:extLst>
+            <p:extLst/>
           </p:nvPr>
         </p:nvGraphicFramePr>
         <p:xfrm>
           <a:off x="180474" y="223710"/>
-          <a:ext cx="7025777" cy="3473130"/>
+          <a:ext cx="7025777" cy="3648063"/>
         </p:xfrm>
         <a:graphic>
           <a:graphicData uri="http://schemas.openxmlformats.org/drawingml/2006/table">
@@ -4510,7 +4502,7 @@
                   </a:ext>
                 </a:extLst>
               </a:tr>
-              <a:tr h="0">
+              <a:tr h="395805">
                 <a:tc gridSpan="4">
                   <a:txBody>
                     <a:bodyPr/>
@@ -4546,20 +4538,17 @@
                           <a:ea typeface="ＭＳ Ｐゴシック" pitchFamily="-112" charset="-128"/>
                           <a:cs typeface="Times New Roman" pitchFamily="-112" charset="0"/>
                         </a:rPr>
-                        <a:t>START POSITION : </a:t>
+                        <a:t>START POSITION : String 1: standing on either set of X’s, hands relaxed at sides. String 2: standing on opposite set of X’s, hands relaxed at sides.</a:t>
                       </a:r>
-                      <a:r>
-                        <a:rPr lang="en-US" sz="1100" b="1" i="0" u="none" strike="noStrike" kern="1200" cap="none" spc="0" baseline="0" dirty="0">
-                          <a:solidFill>
-                            <a:srgbClr val="000000"/>
-                          </a:solidFill>
-                          <a:uFillTx/>
-                          <a:latin typeface="Arial" pitchFamily="34"/>
-                          <a:ea typeface="Arial" pitchFamily="34"/>
-                          <a:cs typeface="Arial" pitchFamily="34"/>
-                        </a:rPr>
-                        <a:t>Standing anywhere outside the shooting area. Hands relaxed at sides.</a:t>
-                      </a:r>
+                      <a:endParaRPr lang="en-US" sz="1100" b="1" i="0" u="none" strike="noStrike" kern="1200" cap="none" spc="0" baseline="0" dirty="0">
+                        <a:solidFill>
+                          <a:srgbClr val="000000"/>
+                        </a:solidFill>
+                        <a:uFillTx/>
+                        <a:latin typeface="Arial" pitchFamily="34"/>
+                        <a:ea typeface="Arial" pitchFamily="34"/>
+                        <a:cs typeface="Arial" pitchFamily="34"/>
+                      </a:endParaRPr>
                     </a:p>
                     <a:p>
                       <a:pPr marL="0" marR="0" lvl="0" indent="0" algn="l" defTabSz="966788" rtl="0" eaLnBrk="1" fontAlgn="base" latinLnBrk="0" hangingPunct="1">
@@ -4676,7 +4665,7 @@
                   </a:ext>
                 </a:extLst>
               </a:tr>
-              <a:tr h="636143">
+              <a:tr h="742623">
                 <a:tc gridSpan="2">
                   <a:txBody>
                     <a:bodyPr/>
@@ -4981,35 +4970,8 @@
                           <a:ea typeface="ＭＳ Ｐゴシック" pitchFamily="-112" charset="-128"/>
                           <a:cs typeface="Times New Roman" pitchFamily="-112" charset="0"/>
                         </a:rPr>
-                        <a:t>RULES: Failure to perform a mandatory reload will be a procedural per shot fired. </a:t>
+                        <a:t>RULES: Failure to perform a mandatory reload will be a procedural per shot fired.</a:t>
                       </a:r>
-                      <a:r>
-                        <a:rPr kumimoji="0" lang="en-US" sz="1100" b="1" i="0" u="none" strike="noStrike" cap="none" normalizeH="0" baseline="0">
-                          <a:ln>
-                            <a:noFill/>
-                          </a:ln>
-                          <a:solidFill>
-                            <a:schemeClr val="tx1"/>
-                          </a:solidFill>
-                          <a:effectLst/>
-                          <a:latin typeface="Arial" charset="0"/>
-                          <a:ea typeface="ＭＳ Ｐゴシック" pitchFamily="-112" charset="-128"/>
-                          <a:cs typeface="Times New Roman" pitchFamily="-112" charset="0"/>
-                        </a:rPr>
-                        <a:t>Failure to perform a mandatory reload will be a procedural per shot fired.</a:t>
-                      </a:r>
-                      <a:endParaRPr kumimoji="0" lang="en-US" sz="1100" b="1" i="0" u="none" strike="noStrike" cap="none" normalizeH="0" baseline="0" dirty="0">
-                        <a:ln>
-                          <a:noFill/>
-                        </a:ln>
-                        <a:solidFill>
-                          <a:schemeClr val="tx1"/>
-                        </a:solidFill>
-                        <a:effectLst/>
-                        <a:latin typeface="Arial" charset="0"/>
-                        <a:ea typeface="ＭＳ Ｐゴシック" pitchFamily="-112" charset="-128"/>
-                        <a:cs typeface="Times New Roman" pitchFamily="-112" charset="0"/>
-                      </a:endParaRPr>
                     </a:p>
                   </a:txBody>
                   <a:tcPr marL="45720" marR="45720" horzOverflow="overflow">
@@ -5076,7 +5038,7 @@
                   </a:ext>
                 </a:extLst>
               </a:tr>
-              <a:tr h="669617">
+              <a:tr h="1280160">
                 <a:tc gridSpan="2">
                   <a:txBody>
                     <a:bodyPr/>
@@ -5111,7 +5073,7 @@
                           <a:ea typeface="ＭＳ Ｐゴシック" pitchFamily="-112" charset="-128"/>
                           <a:cs typeface="Times New Roman" pitchFamily="-112" charset="0"/>
                         </a:rPr>
-                        <a:t>STAGE PROCEDURE: String 1: engage each target with 2 rounds each, perform a mandatory reload then engage each target with 2 rounds each strong hand only. String 2: engage each target with 2 rounds each, perform a mandatory reload, then engage each target with 2 rounds each weak hand only</a:t>
+                        <a:t>STAGE PROCEDURE: String 1: engage each target with 2 rounds each, perform a mandatory reload then engage each target with 2 rounds. String 2: engage each target with 2 rounds each, perform a mandatory reload, then engage each target with 2 rounds</a:t>
                       </a:r>
                     </a:p>
                   </a:txBody>
@@ -5286,10 +5248,10 @@
       </p:pic>
       <p:pic>
         <p:nvPicPr>
-          <p:cNvPr id="2" name="Picture 1">
+          <p:cNvPr id="3" name="Picture 2">
             <a:extLst>
               <a:ext uri="{FF2B5EF4-FFF2-40B4-BE49-F238E27FC236}">
-                <a16:creationId xmlns:a16="http://schemas.microsoft.com/office/drawing/2014/main" id="{C09FA7FB-F282-470F-BDFF-DF7BF94A137A}"/>
+                <a16:creationId xmlns:a16="http://schemas.microsoft.com/office/drawing/2014/main" id="{21FA6569-D73C-4472-9409-0BD7AE8535FA}"/>
               </a:ext>
             </a:extLst>
           </p:cNvPr>
@@ -5306,8 +5268,8 @@
         </p:blipFill>
         <p:spPr>
           <a:xfrm>
-            <a:off x="180474" y="3696840"/>
-            <a:ext cx="7026940" cy="5325303"/>
+            <a:off x="180474" y="3917053"/>
+            <a:ext cx="7025776" cy="5584591"/>
           </a:xfrm>
           <a:prstGeom prst="rect">
             <a:avLst/>

</xml_diff>

<commit_message>
Updated some stages for flow/legality/fun
</commit_message>
<xml_diff>
--- a/21-25 rounds/I Have Standards - 24 Rounds - Virginia Count/I Have Standards.pptx
+++ b/21-25 rounds/I Have Standards - 24 Rounds - Virginia Count/I Have Standards.pptx
@@ -8,7 +8,7 @@
     <p:notesMasterId r:id="rId3"/>
   </p:notesMasterIdLst>
   <p:sldIdLst>
-    <p:sldId id="275" r:id="rId2"/>
+    <p:sldId id="274" r:id="rId2"/>
   </p:sldIdLst>
   <p:sldSz cx="7315200" cy="9601200"/>
   <p:notesSz cx="6858000" cy="9144000"/>
@@ -4153,12 +4153,16 @@
             <a:graphicFrameLocks noGrp="1"/>
           </p:cNvGraphicFramePr>
           <p:nvPr>
-            <p:extLst/>
+            <p:extLst>
+              <p:ext uri="{D42A27DB-BD31-4B8C-83A1-F6EECF244321}">
+                <p14:modId xmlns:p14="http://schemas.microsoft.com/office/powerpoint/2010/main" val="3673363528"/>
+              </p:ext>
+            </p:extLst>
           </p:nvPr>
         </p:nvGraphicFramePr>
         <p:xfrm>
           <a:off x="180474" y="223710"/>
-          <a:ext cx="7025777" cy="3648063"/>
+          <a:ext cx="7025777" cy="3800463"/>
         </p:xfrm>
         <a:graphic>
           <a:graphicData uri="http://schemas.openxmlformats.org/drawingml/2006/table">
@@ -4970,7 +4974,7 @@
                           <a:ea typeface="ＭＳ Ｐゴシック" pitchFamily="-112" charset="-128"/>
                           <a:cs typeface="Times New Roman" pitchFamily="-112" charset="0"/>
                         </a:rPr>
-                        <a:t>RULES: Failure to perform a mandatory reload will be a procedural per shot fired.</a:t>
+                        <a:t>RULES: Failure to perform a mandatory reload will be a procedural per shot fired. Failure to fire last 6 rounds strong/weak hand only will be a procedural per shot fired.</a:t>
                       </a:r>
                     </a:p>
                   </a:txBody>
@@ -5073,7 +5077,7 @@
                           <a:ea typeface="ＭＳ Ｐゴシック" pitchFamily="-112" charset="-128"/>
                           <a:cs typeface="Times New Roman" pitchFamily="-112" charset="0"/>
                         </a:rPr>
-                        <a:t>STAGE PROCEDURE: String 1: engage each target with 2 rounds each, perform a mandatory reload then engage each target with 2 rounds. String 2: engage each target with 2 rounds each, perform a mandatory reload, then engage each target with 2 rounds</a:t>
+                        <a:t>STAGE PROCEDURE: String 1: engage each target with 2 rounds each, perform a mandatory reload then engage each target with 2 rounds. The last 6 shots fired must be strong hand only. String 2: engage each target with 2 rounds each, perform a mandatory reload, then engage each target with 2 rounds. The last 6 shots fired must be weak hand only</a:t>
                       </a:r>
                     </a:p>
                   </a:txBody>
@@ -5268,8 +5272,8 @@
         </p:blipFill>
         <p:spPr>
           <a:xfrm>
-            <a:off x="180474" y="3917053"/>
-            <a:ext cx="7025776" cy="5584591"/>
+            <a:off x="243714" y="4011016"/>
+            <a:ext cx="6891012" cy="5477471"/>
           </a:xfrm>
           <a:prstGeom prst="rect">
             <a:avLst/>

</xml_diff>

<commit_message>
Updated the standards stage to be legal... again. updated a few other things
</commit_message>
<xml_diff>
--- a/21-25 rounds/I Have Standards - 24 Rounds - Virginia Count/I Have Standards.pptx
+++ b/21-25 rounds/I Have Standards - 24 Rounds - Virginia Count/I Have Standards.pptx
@@ -258,7 +258,7 @@
               <a:pPr>
                 <a:defRPr/>
               </a:pPr>
-              <a:t>6/19/2019</a:t>
+              <a:t>6/20/2019</a:t>
             </a:fld>
             <a:endParaRPr lang="en-US"/>
           </a:p>
@@ -4155,14 +4155,14 @@
           <p:nvPr>
             <p:extLst>
               <p:ext uri="{D42A27DB-BD31-4B8C-83A1-F6EECF244321}">
-                <p14:modId xmlns:p14="http://schemas.microsoft.com/office/powerpoint/2010/main" val="3673363528"/>
+                <p14:modId xmlns:p14="http://schemas.microsoft.com/office/powerpoint/2010/main" val="3359727411"/>
               </p:ext>
             </p:extLst>
           </p:nvPr>
         </p:nvGraphicFramePr>
         <p:xfrm>
           <a:off x="180474" y="223710"/>
-          <a:ext cx="7025777" cy="3800463"/>
+          <a:ext cx="7025777" cy="3501324"/>
         </p:xfrm>
         <a:graphic>
           <a:graphicData uri="http://schemas.openxmlformats.org/drawingml/2006/table">
@@ -4542,47 +4542,8 @@
                           <a:ea typeface="ＭＳ Ｐゴシック" pitchFamily="-112" charset="-128"/>
                           <a:cs typeface="Times New Roman" pitchFamily="-112" charset="0"/>
                         </a:rPr>
-                        <a:t>START POSITION : String 1: standing on either set of X’s, hands relaxed at sides. String 2: standing on opposite set of X’s, hands relaxed at sides.</a:t>
+                        <a:t>START POSITION : Standing on either set of X’s, hands relaxed at sides.</a:t>
                       </a:r>
-                      <a:endParaRPr lang="en-US" sz="1100" b="1" i="0" u="none" strike="noStrike" kern="1200" cap="none" spc="0" baseline="0" dirty="0">
-                        <a:solidFill>
-                          <a:srgbClr val="000000"/>
-                        </a:solidFill>
-                        <a:uFillTx/>
-                        <a:latin typeface="Arial" pitchFamily="34"/>
-                        <a:ea typeface="Arial" pitchFamily="34"/>
-                        <a:cs typeface="Arial" pitchFamily="34"/>
-                      </a:endParaRPr>
-                    </a:p>
-                    <a:p>
-                      <a:pPr marL="0" marR="0" lvl="0" indent="0" algn="l" defTabSz="966788" rtl="0" eaLnBrk="1" fontAlgn="base" latinLnBrk="0" hangingPunct="1">
-                        <a:lnSpc>
-                          <a:spcPct val="90000"/>
-                        </a:lnSpc>
-                        <a:spcBef>
-                          <a:spcPct val="10000"/>
-                        </a:spcBef>
-                        <a:spcAft>
-                          <a:spcPct val="0"/>
-                        </a:spcAft>
-                        <a:buClrTx/>
-                        <a:buSzTx/>
-                        <a:buFontTx/>
-                        <a:buNone/>
-                        <a:tabLst/>
-                      </a:pPr>
-                      <a:endParaRPr kumimoji="0" lang="en-US" sz="1100" b="1" i="0" u="none" strike="noStrike" cap="none" normalizeH="0" baseline="0" dirty="0">
-                        <a:ln>
-                          <a:noFill/>
-                        </a:ln>
-                        <a:solidFill>
-                          <a:schemeClr val="tx1"/>
-                        </a:solidFill>
-                        <a:effectLst/>
-                        <a:latin typeface="Arial" charset="0"/>
-                        <a:ea typeface="ＭＳ Ｐゴシック" pitchFamily="-112" charset="-128"/>
-                        <a:cs typeface="Times New Roman" pitchFamily="-112" charset="0"/>
-                      </a:endParaRPr>
                     </a:p>
                   </a:txBody>
                   <a:tcPr marL="18288" marR="18288" marT="36576" marB="36576" horzOverflow="overflow">
@@ -4974,7 +4935,7 @@
                           <a:ea typeface="ＭＳ Ｐゴシック" pitchFamily="-112" charset="-128"/>
                           <a:cs typeface="Times New Roman" pitchFamily="-112" charset="0"/>
                         </a:rPr>
-                        <a:t>RULES: Failure to perform a mandatory reload will be a procedural per shot fired. Failure to fire last 6 rounds strong/weak hand only will be a procedural per shot fired.</a:t>
+                        <a:t>RULES: Failure to perform a mandatory reload will be a procedural per shot fired. Failure to fire last 6 rounds strong hand only will be a procedural per shot fired.</a:t>
                       </a:r>
                     </a:p>
                   </a:txBody>
@@ -5077,7 +5038,7 @@
                           <a:ea typeface="ＭＳ Ｐゴシック" pitchFamily="-112" charset="-128"/>
                           <a:cs typeface="Times New Roman" pitchFamily="-112" charset="0"/>
                         </a:rPr>
-                        <a:t>STAGE PROCEDURE: String 1: engage each target with 2 rounds each, perform a mandatory reload then engage each target with 2 rounds. The last 6 shots fired must be strong hand only. String 2: engage each target with 2 rounds each, perform a mandatory reload, then engage each target with 2 rounds. The last 6 shots fired must be weak hand only</a:t>
+                        <a:t>STAGE PROCEDURE: Engage each target with 2 rounds each, perform a mandatory reload then engage each target with 2 rounds. The last 6 shots fired must be strong hand only.</a:t>
                       </a:r>
                     </a:p>
                   </a:txBody>

</xml_diff>